<commit_message>
Update for papers up to 2023
</commit_message>
<xml_diff>
--- a/data/Prisma_flowchart_2023.pptx
+++ b/data/Prisma_flowchart_2023.pptx
@@ -243,7 +243,7 @@
           <a:p>
             <a:fld id="{448ABB75-5DC1-1548-84C7-684F967F9B0B}" type="datetimeFigureOut">
               <a:rPr lang="es-ES_tradnl" smtClean="0"/>
-              <a:t>13/10/21</a:t>
+              <a:t>5/11/23</a:t>
             </a:fld>
             <a:endParaRPr lang="es-ES_tradnl"/>
           </a:p>
@@ -413,7 +413,7 @@
           <a:p>
             <a:fld id="{448ABB75-5DC1-1548-84C7-684F967F9B0B}" type="datetimeFigureOut">
               <a:rPr lang="es-ES_tradnl" smtClean="0"/>
-              <a:t>13/10/21</a:t>
+              <a:t>5/11/23</a:t>
             </a:fld>
             <a:endParaRPr lang="es-ES_tradnl"/>
           </a:p>
@@ -593,7 +593,7 @@
           <a:p>
             <a:fld id="{448ABB75-5DC1-1548-84C7-684F967F9B0B}" type="datetimeFigureOut">
               <a:rPr lang="es-ES_tradnl" smtClean="0"/>
-              <a:t>13/10/21</a:t>
+              <a:t>5/11/23</a:t>
             </a:fld>
             <a:endParaRPr lang="es-ES_tradnl"/>
           </a:p>
@@ -763,7 +763,7 @@
           <a:p>
             <a:fld id="{448ABB75-5DC1-1548-84C7-684F967F9B0B}" type="datetimeFigureOut">
               <a:rPr lang="es-ES_tradnl" smtClean="0"/>
-              <a:t>13/10/21</a:t>
+              <a:t>5/11/23</a:t>
             </a:fld>
             <a:endParaRPr lang="es-ES_tradnl"/>
           </a:p>
@@ -1007,7 +1007,7 @@
           <a:p>
             <a:fld id="{448ABB75-5DC1-1548-84C7-684F967F9B0B}" type="datetimeFigureOut">
               <a:rPr lang="es-ES_tradnl" smtClean="0"/>
-              <a:t>13/10/21</a:t>
+              <a:t>5/11/23</a:t>
             </a:fld>
             <a:endParaRPr lang="es-ES_tradnl"/>
           </a:p>
@@ -1239,7 +1239,7 @@
           <a:p>
             <a:fld id="{448ABB75-5DC1-1548-84C7-684F967F9B0B}" type="datetimeFigureOut">
               <a:rPr lang="es-ES_tradnl" smtClean="0"/>
-              <a:t>13/10/21</a:t>
+              <a:t>5/11/23</a:t>
             </a:fld>
             <a:endParaRPr lang="es-ES_tradnl"/>
           </a:p>
@@ -1606,7 +1606,7 @@
           <a:p>
             <a:fld id="{448ABB75-5DC1-1548-84C7-684F967F9B0B}" type="datetimeFigureOut">
               <a:rPr lang="es-ES_tradnl" smtClean="0"/>
-              <a:t>13/10/21</a:t>
+              <a:t>5/11/23</a:t>
             </a:fld>
             <a:endParaRPr lang="es-ES_tradnl"/>
           </a:p>
@@ -1724,7 +1724,7 @@
           <a:p>
             <a:fld id="{448ABB75-5DC1-1548-84C7-684F967F9B0B}" type="datetimeFigureOut">
               <a:rPr lang="es-ES_tradnl" smtClean="0"/>
-              <a:t>13/10/21</a:t>
+              <a:t>5/11/23</a:t>
             </a:fld>
             <a:endParaRPr lang="es-ES_tradnl"/>
           </a:p>
@@ -1819,7 +1819,7 @@
           <a:p>
             <a:fld id="{448ABB75-5DC1-1548-84C7-684F967F9B0B}" type="datetimeFigureOut">
               <a:rPr lang="es-ES_tradnl" smtClean="0"/>
-              <a:t>13/10/21</a:t>
+              <a:t>5/11/23</a:t>
             </a:fld>
             <a:endParaRPr lang="es-ES_tradnl"/>
           </a:p>
@@ -2096,7 +2096,7 @@
           <a:p>
             <a:fld id="{448ABB75-5DC1-1548-84C7-684F967F9B0B}" type="datetimeFigureOut">
               <a:rPr lang="es-ES_tradnl" smtClean="0"/>
-              <a:t>13/10/21</a:t>
+              <a:t>5/11/23</a:t>
             </a:fld>
             <a:endParaRPr lang="es-ES_tradnl"/>
           </a:p>
@@ -2353,7 +2353,7 @@
           <a:p>
             <a:fld id="{448ABB75-5DC1-1548-84C7-684F967F9B0B}" type="datetimeFigureOut">
               <a:rPr lang="es-ES_tradnl" smtClean="0"/>
-              <a:t>13/10/21</a:t>
+              <a:t>5/11/23</a:t>
             </a:fld>
             <a:endParaRPr lang="es-ES_tradnl"/>
           </a:p>
@@ -2569,7 +2569,7 @@
           <a:p>
             <a:fld id="{448ABB75-5DC1-1548-84C7-684F967F9B0B}" type="datetimeFigureOut">
               <a:rPr lang="es-ES_tradnl" smtClean="0"/>
-              <a:t>13/10/21</a:t>
+              <a:t>5/11/23</a:t>
             </a:fld>
             <a:endParaRPr lang="es-ES_tradnl"/>
           </a:p>
@@ -3193,7 +3193,7 @@
                 <a:rPr lang="en-GB" dirty="0">
                   <a:latin typeface="DINOT" panose="020B0504020101020102" pitchFamily="34" charset="77"/>
                 </a:rPr>
-                <a:t>n = 1829</a:t>
+                <a:t>n = 3070</a:t>
               </a:r>
             </a:p>
           </p:txBody>
@@ -3253,7 +3253,7 @@
                 <a:rPr lang="en-GB" dirty="0">
                   <a:latin typeface="DINOT" panose="020B0504020101020102" pitchFamily="34" charset="77"/>
                 </a:rPr>
-                <a:t>n = 1591</a:t>
+                <a:t>n = 2675</a:t>
               </a:r>
             </a:p>
           </p:txBody>
@@ -3313,7 +3313,7 @@
                 <a:rPr lang="en-GB" dirty="0">
                   <a:latin typeface="DINOT" panose="020B0504020101020102" pitchFamily="34" charset="77"/>
                 </a:rPr>
-                <a:t>n = 1591</a:t>
+                <a:t>n = 2675</a:t>
               </a:r>
             </a:p>
           </p:txBody>
@@ -3456,7 +3456,7 @@
                 <a:rPr lang="en-GB" dirty="0">
                   <a:latin typeface="DINOT" panose="020B0504020101020102" pitchFamily="34" charset="77"/>
                 </a:rPr>
-                <a:t>Records excluded based on title and abstract (n = 1331)</a:t>
+                <a:t>Records excluded based on title and abstract (n = 2316)</a:t>
               </a:r>
             </a:p>
             <a:p>
@@ -3580,7 +3580,7 @@
                 <a:rPr lang="en-GB" dirty="0">
                   <a:latin typeface="DINOT" panose="020B0504020101020102" pitchFamily="34" charset="77"/>
                 </a:rPr>
-                <a:t>n = 260</a:t>
+                <a:t>n = 359</a:t>
               </a:r>
             </a:p>
           </p:txBody>
@@ -3625,7 +3625,7 @@
                 <a:rPr lang="en-GB" dirty="0">
                   <a:latin typeface="DINOT" panose="020B0504020101020102" pitchFamily="34" charset="77"/>
                 </a:rPr>
-                <a:t>Full text articles excluded for following reasons (n = 160):</a:t>
+                <a:t>Full text articles excluded for following reasons (n = 228):</a:t>
               </a:r>
             </a:p>
             <a:p>
@@ -3637,7 +3637,7 @@
                 <a:rPr lang="en-GB" dirty="0">
                   <a:latin typeface="DINOT" panose="020B0504020101020102" pitchFamily="34" charset="77"/>
                 </a:rPr>
-                <a:t>Not an implemented AR application (n = 65)</a:t>
+                <a:t>Not an implemented AR application (n = 81)</a:t>
               </a:r>
             </a:p>
             <a:p>
@@ -3649,7 +3649,7 @@
                 <a:rPr lang="en-GB" dirty="0">
                   <a:latin typeface="DINOT" panose="020B0504020101020102" pitchFamily="34" charset="77"/>
                 </a:rPr>
-                <a:t>Not for education (n = 44)</a:t>
+                <a:t>Not for education (n = 60)</a:t>
               </a:r>
             </a:p>
             <a:p>
@@ -3661,7 +3661,7 @@
                 <a:rPr lang="en-GB" dirty="0">
                   <a:latin typeface="DINOT" panose="020B0504020101020102" pitchFamily="34" charset="77"/>
                 </a:rPr>
-                <a:t>Not interactive, collaborative or multiuser (n = 28)</a:t>
+                <a:t>Not interactive, collaborative or multiuser (n = 47)</a:t>
               </a:r>
             </a:p>
             <a:p>
@@ -3673,7 +3673,7 @@
                 <a:rPr lang="en-GB" dirty="0">
                   <a:latin typeface="DINOT" panose="020B0504020101020102" pitchFamily="34" charset="77"/>
                 </a:rPr>
-                <a:t>Outside target audience (n = 20)</a:t>
+                <a:t>Outside target audience (n = 36)</a:t>
               </a:r>
             </a:p>
             <a:p>
@@ -3685,7 +3685,7 @@
                 <a:rPr lang="en-GB" dirty="0">
                   <a:latin typeface="DINOT" panose="020B0504020101020102" pitchFamily="34" charset="77"/>
                 </a:rPr>
-                <a:t>Not peer reviewed (n = 3)</a:t>
+                <a:t>Not peer reviewed (n = 4)</a:t>
               </a:r>
             </a:p>
             <a:p>
@@ -3760,7 +3760,7 @@
                 <a:rPr lang="en-GB" dirty="0">
                   <a:latin typeface="DINOT" panose="020B0504020101020102" pitchFamily="34" charset="77"/>
                 </a:rPr>
-                <a:t>n = 100</a:t>
+                <a:t>n = 131</a:t>
               </a:r>
             </a:p>
           </p:txBody>

</xml_diff>